<commit_message>
Added some notes for new slides
</commit_message>
<xml_diff>
--- a/summerschool-aalborg-jpg.pptx
+++ b/summerschool-aalborg-jpg.pptx
@@ -24,11 +24,11 @@
     <p:sldId id="269" r:id="rId12"/>
     <p:sldId id="336" r:id="rId13"/>
     <p:sldId id="270" r:id="rId14"/>
-    <p:sldId id="273" r:id="rId15"/>
-    <p:sldId id="271" r:id="rId16"/>
-    <p:sldId id="272" r:id="rId17"/>
-    <p:sldId id="276" r:id="rId18"/>
-    <p:sldId id="337" r:id="rId19"/>
+    <p:sldId id="271" r:id="rId15"/>
+    <p:sldId id="272" r:id="rId16"/>
+    <p:sldId id="276" r:id="rId17"/>
+    <p:sldId id="337" r:id="rId18"/>
+    <p:sldId id="341" r:id="rId19"/>
     <p:sldId id="275" r:id="rId20"/>
     <p:sldId id="278" r:id="rId21"/>
     <p:sldId id="279" r:id="rId22"/>
@@ -9006,43 +9006,95 @@
         </p:nvSpPr>
         <p:spPr/>
         <p:txBody>
-          <a:bodyPr>
-            <a:normAutofit fontScale="90000"/>
-          </a:bodyPr>
-          <a:lstStyle/>
-          <a:p>
-            <a:r>
-              <a:rPr lang="en-US"/>
-              <a:t>Verification of energy specifications</a:t>
-            </a:r>
-          </a:p>
-        </p:txBody>
-      </p:sp>
-      <p:pic>
-        <p:nvPicPr>
-          <p:cNvPr id="6" name="Content Placeholder 5" descr="analysis.png"/>
-          <p:cNvPicPr>
-            <a:picLocks noGrp="1" noChangeAspect="1"/>
-          </p:cNvPicPr>
+          <a:bodyPr/>
+          <a:lstStyle/>
+          <a:p>
+            <a:r>
+              <a:rPr lang="en-US"/>
+              <a:t>Summary of goals</a:t>
+            </a:r>
+          </a:p>
+        </p:txBody>
+      </p:sp>
+      <p:sp>
+        <p:nvSpPr>
+          <p:cNvPr id="3" name="Content Placeholder 2"/>
+          <p:cNvSpPr>
+            <a:spLocks noGrp="1"/>
+          </p:cNvSpPr>
           <p:nvPr>
             <p:ph idx="1"/>
           </p:nvPr>
-        </p:nvPicPr>
-        <p:blipFill>
-          <a:blip r:embed="rId2" cstate="print">
-            <a:extLst>
-              <a:ext uri="{28A0092B-C50C-407E-A947-70E740481C1C}">
-                <a14:useLocalDpi xmlns:a14="http://schemas.microsoft.com/office/drawing/2010/main"/>
-              </a:ext>
-            </a:extLst>
-          </a:blip>
-          <a:srcRect t="3920" b="3920"/>
-          <a:stretch>
-            <a:fillRect/>
-          </a:stretch>
-        </p:blipFill>
+        </p:nvSpPr>
         <p:spPr/>
-      </p:pic>
+        <p:txBody>
+          <a:bodyPr/>
+          <a:lstStyle/>
+          <a:p>
+            <a:r>
+              <a:rPr lang="en-US"/>
+              <a:t>We want </a:t>
+            </a:r>
+            <a:r>
+              <a:rPr lang="en-US">
+                <a:solidFill>
+                  <a:srgbClr val="FF0000"/>
+                </a:solidFill>
+              </a:rPr>
+              <a:t>tools</a:t>
+            </a:r>
+            <a:r>
+              <a:rPr lang="en-US"/>
+              <a:t> for the programmer</a:t>
+            </a:r>
+          </a:p>
+          <a:p>
+            <a:endParaRPr lang="en-US"/>
+          </a:p>
+          <a:p>
+            <a:pPr lvl="1"/>
+            <a:r>
+              <a:rPr lang="en-US"/>
+              <a:t>that give information about the energy usage of programs without running them (</a:t>
+            </a:r>
+            <a:r>
+              <a:rPr lang="en-US">
+                <a:solidFill>
+                  <a:srgbClr val="FF0000"/>
+                </a:solidFill>
+              </a:rPr>
+              <a:t>energy transparency</a:t>
+            </a:r>
+            <a:r>
+              <a:rPr lang="en-US"/>
+              <a:t>)</a:t>
+            </a:r>
+          </a:p>
+          <a:p>
+            <a:pPr lvl="1"/>
+            <a:endParaRPr lang="en-US"/>
+          </a:p>
+          <a:p>
+            <a:pPr lvl="1"/>
+            <a:r>
+              <a:rPr lang="en-US"/>
+              <a:t>that allow energy assertions to be checked (</a:t>
+            </a:r>
+            <a:r>
+              <a:rPr lang="en-US">
+                <a:solidFill>
+                  <a:srgbClr val="FF0000"/>
+                </a:solidFill>
+              </a:rPr>
+              <a:t>energy design goals</a:t>
+            </a:r>
+            <a:r>
+              <a:rPr lang="en-US"/>
+              <a:t>)</a:t>
+            </a:r>
+          </a:p>
+        </p:txBody>
+      </p:sp>
       <p:sp>
         <p:nvSpPr>
           <p:cNvPr id="4" name="Footer Placeholder 3"/>
@@ -9092,7 +9144,7 @@
     </p:spTree>
     <p:extLst>
       <p:ext uri="{BB962C8B-B14F-4D97-AF65-F5344CB8AC3E}">
-        <p14:creationId xmlns:p14="http://schemas.microsoft.com/office/powerpoint/2010/main" val="260871004"/>
+        <p14:creationId xmlns:p14="http://schemas.microsoft.com/office/powerpoint/2010/main" val="479515034"/>
       </p:ext>
     </p:extLst>
   </p:cSld>
@@ -9136,7 +9188,7 @@
           <a:p>
             <a:r>
               <a:rPr lang="en-US"/>
-              <a:t>Summary of goals</a:t>
+              <a:t>Analysis of programs</a:t>
             </a:r>
           </a:p>
         </p:txBody>
@@ -9158,7 +9210,34 @@
           <a:p>
             <a:r>
               <a:rPr lang="en-US"/>
-              <a:t>We want </a:t>
+              <a:t>A program is a physical object</a:t>
+            </a:r>
+          </a:p>
+          <a:p>
+            <a:endParaRPr lang="en-US"/>
+          </a:p>
+          <a:p>
+            <a:pPr lvl="1"/>
+            <a:r>
+              <a:rPr lang="en-US"/>
+              <a:t>some symbols on paper</a:t>
+            </a:r>
+          </a:p>
+          <a:p>
+            <a:pPr lvl="1"/>
+            <a:r>
+              <a:rPr lang="en-US"/>
+              <a:t>a pattern of bits in memory</a:t>
+            </a:r>
+          </a:p>
+          <a:p>
+            <a:pPr lvl="1"/>
+            <a:endParaRPr lang="en-US"/>
+          </a:p>
+          <a:p>
+            <a:r>
+              <a:rPr lang="en-US"/>
+              <a:t>But what is the </a:t>
             </a:r>
             <a:r>
               <a:rPr lang="en-US">
@@ -9166,21 +9245,17 @@
                   <a:srgbClr val="FF0000"/>
                 </a:solidFill>
               </a:rPr>
-              <a:t>tools</a:t>
-            </a:r>
-            <a:r>
-              <a:rPr lang="en-US"/>
-              <a:t> for the programmer</a:t>
-            </a:r>
-          </a:p>
-          <a:p>
-            <a:endParaRPr lang="en-US"/>
-          </a:p>
-          <a:p>
-            <a:pPr lvl="1"/>
-            <a:r>
-              <a:rPr lang="en-US"/>
-              <a:t>that give information about the energy usage of programs without running them (</a:t>
+              <a:t>meaning</a:t>
+            </a:r>
+            <a:r>
+              <a:rPr lang="en-US"/>
+              <a:t> of a program?</a:t>
+            </a:r>
+          </a:p>
+          <a:p>
+            <a:r>
+              <a:rPr lang="en-US"/>
+              <a:t>This is program </a:t>
             </a:r>
             <a:r>
               <a:rPr lang="en-US">
@@ -9188,34 +9263,11 @@
                   <a:srgbClr val="FF0000"/>
                 </a:solidFill>
               </a:rPr>
-              <a:t>energy transparency</a:t>
-            </a:r>
-            <a:r>
-              <a:rPr lang="en-US"/>
-              <a:t>)</a:t>
-            </a:r>
-          </a:p>
-          <a:p>
-            <a:pPr lvl="1"/>
-            <a:endParaRPr lang="en-US"/>
-          </a:p>
-          <a:p>
-            <a:pPr lvl="1"/>
-            <a:r>
-              <a:rPr lang="en-US"/>
-              <a:t>that allow energy assertions to be checked (</a:t>
-            </a:r>
-            <a:r>
-              <a:rPr lang="en-US">
-                <a:solidFill>
-                  <a:srgbClr val="FF0000"/>
-                </a:solidFill>
-              </a:rPr>
-              <a:t>energy design goals</a:t>
-            </a:r>
-            <a:r>
-              <a:rPr lang="en-US"/>
-              <a:t>)</a:t>
+              <a:t>semantics</a:t>
+            </a:r>
+            <a:r>
+              <a:rPr lang="en-US"/>
+              <a:t>.</a:t>
             </a:r>
           </a:p>
         </p:txBody>
@@ -9269,7 +9321,7 @@
     </p:spTree>
     <p:extLst>
       <p:ext uri="{BB962C8B-B14F-4D97-AF65-F5344CB8AC3E}">
-        <p14:creationId xmlns:p14="http://schemas.microsoft.com/office/powerpoint/2010/main" val="479515034"/>
+        <p14:creationId xmlns:p14="http://schemas.microsoft.com/office/powerpoint/2010/main" val="822471607"/>
       </p:ext>
     </p:extLst>
   </p:cSld>
@@ -9313,86 +9365,7 @@
           <a:p>
             <a:r>
               <a:rPr lang="en-US"/>
-              <a:t>Analysis of programs</a:t>
-            </a:r>
-          </a:p>
-        </p:txBody>
-      </p:sp>
-      <p:sp>
-        <p:nvSpPr>
-          <p:cNvPr id="3" name="Content Placeholder 2"/>
-          <p:cNvSpPr>
-            <a:spLocks noGrp="1"/>
-          </p:cNvSpPr>
-          <p:nvPr>
-            <p:ph idx="1"/>
-          </p:nvPr>
-        </p:nvSpPr>
-        <p:spPr/>
-        <p:txBody>
-          <a:bodyPr/>
-          <a:lstStyle/>
-          <a:p>
-            <a:r>
-              <a:rPr lang="en-US"/>
-              <a:t>A program is a physical object</a:t>
-            </a:r>
-          </a:p>
-          <a:p>
-            <a:endParaRPr lang="en-US"/>
-          </a:p>
-          <a:p>
-            <a:pPr lvl="1"/>
-            <a:r>
-              <a:rPr lang="en-US"/>
-              <a:t>some symbols on paper</a:t>
-            </a:r>
-          </a:p>
-          <a:p>
-            <a:pPr lvl="1"/>
-            <a:r>
-              <a:rPr lang="en-US"/>
-              <a:t>a pattern of bits in memory</a:t>
-            </a:r>
-          </a:p>
-          <a:p>
-            <a:pPr lvl="1"/>
-            <a:endParaRPr lang="en-US"/>
-          </a:p>
-          <a:p>
-            <a:r>
-              <a:rPr lang="en-US"/>
-              <a:t>But what is the </a:t>
-            </a:r>
-            <a:r>
-              <a:rPr lang="en-US">
-                <a:solidFill>
-                  <a:srgbClr val="FF0000"/>
-                </a:solidFill>
-              </a:rPr>
-              <a:t>meaning</a:t>
-            </a:r>
-            <a:r>
-              <a:rPr lang="en-US"/>
-              <a:t> of a program?</a:t>
-            </a:r>
-          </a:p>
-          <a:p>
-            <a:r>
-              <a:rPr lang="en-US"/>
-              <a:t>This is program </a:t>
-            </a:r>
-            <a:r>
-              <a:rPr lang="en-US">
-                <a:solidFill>
-                  <a:srgbClr val="FF0000"/>
-                </a:solidFill>
-              </a:rPr>
-              <a:t>semantics</a:t>
-            </a:r>
-            <a:r>
-              <a:rPr lang="en-US"/>
-              <a:t>.</a:t>
+              <a:t>Program semantics</a:t>
             </a:r>
           </a:p>
         </p:txBody>
@@ -9438,104 +9411,6 @@
               <a:rPr lang="da-DK" smtClean="0"/>
               <a:pPr/>
               <a:t>16</a:t>
-            </a:fld>
-            <a:endParaRPr lang="da-DK" dirty="0"/>
-          </a:p>
-        </p:txBody>
-      </p:sp>
-    </p:spTree>
-    <p:extLst>
-      <p:ext uri="{BB962C8B-B14F-4D97-AF65-F5344CB8AC3E}">
-        <p14:creationId xmlns:p14="http://schemas.microsoft.com/office/powerpoint/2010/main" val="822471607"/>
-      </p:ext>
-    </p:extLst>
-  </p:cSld>
-  <p:clrMapOvr>
-    <a:masterClrMapping/>
-  </p:clrMapOvr>
-</p:sld>
-</file>
-
-<file path=ppt/slides/slide17.xml><?xml version="1.0" encoding="utf-8"?>
-<p:sld xmlns:a="http://schemas.openxmlformats.org/drawingml/2006/main" xmlns:r="http://schemas.openxmlformats.org/officeDocument/2006/relationships" xmlns:p="http://schemas.openxmlformats.org/presentationml/2006/main">
-  <p:cSld>
-    <p:spTree>
-      <p:nvGrpSpPr>
-        <p:cNvPr id="1" name=""/>
-        <p:cNvGrpSpPr/>
-        <p:nvPr/>
-      </p:nvGrpSpPr>
-      <p:grpSpPr>
-        <a:xfrm>
-          <a:off x="0" y="0"/>
-          <a:ext cx="0" cy="0"/>
-          <a:chOff x="0" y="0"/>
-          <a:chExt cx="0" cy="0"/>
-        </a:xfrm>
-      </p:grpSpPr>
-      <p:sp>
-        <p:nvSpPr>
-          <p:cNvPr id="2" name="Title 1"/>
-          <p:cNvSpPr>
-            <a:spLocks noGrp="1"/>
-          </p:cNvSpPr>
-          <p:nvPr>
-            <p:ph type="title"/>
-          </p:nvPr>
-        </p:nvSpPr>
-        <p:spPr/>
-        <p:txBody>
-          <a:bodyPr/>
-          <a:lstStyle/>
-          <a:p>
-            <a:r>
-              <a:rPr lang="en-US"/>
-              <a:t>Program semantics</a:t>
-            </a:r>
-          </a:p>
-        </p:txBody>
-      </p:sp>
-      <p:sp>
-        <p:nvSpPr>
-          <p:cNvPr id="4" name="Footer Placeholder 3"/>
-          <p:cNvSpPr>
-            <a:spLocks noGrp="1"/>
-          </p:cNvSpPr>
-          <p:nvPr>
-            <p:ph type="ftr" sz="quarter" idx="11"/>
-          </p:nvPr>
-        </p:nvSpPr>
-        <p:spPr/>
-        <p:txBody>
-          <a:bodyPr/>
-          <a:lstStyle/>
-          <a:p>
-            <a:r>
-              <a:rPr lang="da-DK" dirty="0"/>
-              <a:t>/74</a:t>
-            </a:r>
-          </a:p>
-        </p:txBody>
-      </p:sp>
-      <p:sp>
-        <p:nvSpPr>
-          <p:cNvPr id="5" name="Slide Number Placeholder 4"/>
-          <p:cNvSpPr>
-            <a:spLocks noGrp="1"/>
-          </p:cNvSpPr>
-          <p:nvPr>
-            <p:ph type="sldNum" sz="quarter" idx="12"/>
-          </p:nvPr>
-        </p:nvSpPr>
-        <p:spPr/>
-        <p:txBody>
-          <a:bodyPr/>
-          <a:lstStyle/>
-          <a:p>
-            <a:fld id="{D2666599-1343-46DA-9433-309CE074520D}" type="slidenum">
-              <a:rPr lang="da-DK" smtClean="0"/>
-              <a:pPr/>
-              <a:t>17</a:t>
             </a:fld>
             <a:endParaRPr lang="da-DK" dirty="0"/>
           </a:p>
@@ -9770,6 +9645,140 @@
 </p:sld>
 </file>
 
+<file path=ppt/slides/slide17.xml><?xml version="1.0" encoding="utf-8"?>
+<p:sld xmlns:a="http://schemas.openxmlformats.org/drawingml/2006/main" xmlns:r="http://schemas.openxmlformats.org/officeDocument/2006/relationships" xmlns:p="http://schemas.openxmlformats.org/presentationml/2006/main">
+  <p:cSld>
+    <p:spTree>
+      <p:nvGrpSpPr>
+        <p:cNvPr id="1" name=""/>
+        <p:cNvGrpSpPr/>
+        <p:nvPr/>
+      </p:nvGrpSpPr>
+      <p:grpSpPr>
+        <a:xfrm>
+          <a:off x="0" y="0"/>
+          <a:ext cx="0" cy="0"/>
+          <a:chOff x="0" y="0"/>
+          <a:chExt cx="0" cy="0"/>
+        </a:xfrm>
+      </p:grpSpPr>
+      <p:sp>
+        <p:nvSpPr>
+          <p:cNvPr id="2" name="Title 1"/>
+          <p:cNvSpPr>
+            <a:spLocks noGrp="1"/>
+          </p:cNvSpPr>
+          <p:nvPr>
+            <p:ph type="title"/>
+          </p:nvPr>
+        </p:nvSpPr>
+        <p:spPr/>
+        <p:txBody>
+          <a:bodyPr>
+            <a:normAutofit fontScale="90000"/>
+          </a:bodyPr>
+          <a:lstStyle/>
+          <a:p>
+            <a:r>
+              <a:rPr lang="en-US"/>
+              <a:t>Different styles of program semantics</a:t>
+            </a:r>
+          </a:p>
+        </p:txBody>
+      </p:sp>
+      <p:sp>
+        <p:nvSpPr>
+          <p:cNvPr id="3" name="Content Placeholder 2"/>
+          <p:cNvSpPr>
+            <a:spLocks noGrp="1"/>
+          </p:cNvSpPr>
+          <p:nvPr>
+            <p:ph idx="1"/>
+          </p:nvPr>
+        </p:nvSpPr>
+        <p:spPr/>
+        <p:txBody>
+          <a:bodyPr/>
+          <a:lstStyle/>
+          <a:p>
+            <a:r>
+              <a:rPr lang="en-US"/>
+              <a:t>Operational (small step)</a:t>
+            </a:r>
+          </a:p>
+          <a:p>
+            <a:r>
+              <a:rPr lang="en-US"/>
+              <a:t>Big-step (Hoare-Floyd pre- post- conditions</a:t>
+            </a:r>
+          </a:p>
+          <a:p>
+            <a:r>
+              <a:rPr lang="en-US"/>
+              <a:t>Denotational</a:t>
+            </a:r>
+          </a:p>
+        </p:txBody>
+      </p:sp>
+      <p:sp>
+        <p:nvSpPr>
+          <p:cNvPr id="4" name="Footer Placeholder 3"/>
+          <p:cNvSpPr>
+            <a:spLocks noGrp="1"/>
+          </p:cNvSpPr>
+          <p:nvPr>
+            <p:ph type="ftr" sz="quarter" idx="11"/>
+          </p:nvPr>
+        </p:nvSpPr>
+        <p:spPr/>
+        <p:txBody>
+          <a:bodyPr/>
+          <a:lstStyle/>
+          <a:p>
+            <a:r>
+              <a:rPr lang="da-DK" dirty="0"/>
+              <a:t>/74</a:t>
+            </a:r>
+          </a:p>
+        </p:txBody>
+      </p:sp>
+      <p:sp>
+        <p:nvSpPr>
+          <p:cNvPr id="5" name="Slide Number Placeholder 4"/>
+          <p:cNvSpPr>
+            <a:spLocks noGrp="1"/>
+          </p:cNvSpPr>
+          <p:nvPr>
+            <p:ph type="sldNum" sz="quarter" idx="12"/>
+          </p:nvPr>
+        </p:nvSpPr>
+        <p:spPr/>
+        <p:txBody>
+          <a:bodyPr/>
+          <a:lstStyle/>
+          <a:p>
+            <a:fld id="{D2666599-1343-46DA-9433-309CE074520D}" type="slidenum">
+              <a:rPr lang="da-DK" smtClean="0"/>
+              <a:pPr/>
+              <a:t>17</a:t>
+            </a:fld>
+            <a:endParaRPr lang="da-DK" dirty="0"/>
+          </a:p>
+        </p:txBody>
+      </p:sp>
+    </p:spTree>
+    <p:extLst>
+      <p:ext uri="{BB962C8B-B14F-4D97-AF65-F5344CB8AC3E}">
+        <p14:creationId xmlns:p14="http://schemas.microsoft.com/office/powerpoint/2010/main" val="1727039141"/>
+      </p:ext>
+    </p:extLst>
+  </p:cSld>
+  <p:clrMapOvr>
+    <a:masterClrMapping/>
+  </p:clrMapOvr>
+</p:sld>
+</file>
+
 <file path=ppt/slides/slide18.xml><?xml version="1.0" encoding="utf-8"?>
 <p:sld xmlns:a="http://schemas.openxmlformats.org/drawingml/2006/main" xmlns:r="http://schemas.openxmlformats.org/officeDocument/2006/relationships" xmlns:p="http://schemas.openxmlformats.org/presentationml/2006/main">
   <p:cSld>
@@ -9799,14 +9808,12 @@
         </p:nvSpPr>
         <p:spPr/>
         <p:txBody>
-          <a:bodyPr>
-            <a:normAutofit fontScale="90000"/>
-          </a:bodyPr>
-          <a:lstStyle/>
-          <a:p>
-            <a:r>
-              <a:rPr lang="en-US"/>
-              <a:t>Different styles of program semantics</a:t>
+          <a:bodyPr/>
+          <a:lstStyle/>
+          <a:p>
+            <a:r>
+              <a:rPr lang="en-US"/>
+              <a:t>Analysis for energy</a:t>
             </a:r>
           </a:p>
         </p:txBody>
@@ -9828,19 +9835,19 @@
           <a:p>
             <a:r>
               <a:rPr lang="en-US"/>
-              <a:t>Operational (small step)</a:t>
-            </a:r>
-          </a:p>
-          <a:p>
-            <a:r>
-              <a:rPr lang="en-US"/>
-              <a:t>Big-step (Hoare-Floyd pre- post- conditions</a:t>
-            </a:r>
-          </a:p>
-          <a:p>
-            <a:r>
-              <a:rPr lang="en-US"/>
-              <a:t>Denotational</a:t>
+              <a:t>Tiwari equation</a:t>
+            </a:r>
+          </a:p>
+          <a:p>
+            <a:r>
+              <a:rPr lang="en-US"/>
+              <a:t>How to estimate number of executions of instructions</a:t>
+            </a:r>
+          </a:p>
+          <a:p>
+            <a:r>
+              <a:rPr lang="en-US"/>
+              <a:t>Parametrised by input data and other factors</a:t>
             </a:r>
           </a:p>
         </p:txBody>
@@ -9894,7 +9901,7 @@
     </p:spTree>
     <p:extLst>
       <p:ext uri="{BB962C8B-B14F-4D97-AF65-F5344CB8AC3E}">
-        <p14:creationId xmlns:p14="http://schemas.microsoft.com/office/powerpoint/2010/main" val="1727039141"/>
+        <p14:creationId xmlns:p14="http://schemas.microsoft.com/office/powerpoint/2010/main" val="2264836136"/>
       </p:ext>
     </p:extLst>
   </p:cSld>

</xml_diff>